<commit_message>
Migrate to MPS 2025.1 - fix #16
</commit_message>
<xml_diff>
--- a/docs/MPS Introduction Course.pptx
+++ b/docs/MPS Introduction Course.pptx
@@ -45,7 +45,7 @@
       </p:grpSpPr>
       <p:sp>
         <p:nvSpPr>
-          <p:cNvPr id="63" name="PlaceHolder 1"/>
+          <p:cNvPr id="56" name="PlaceHolder 1"/>
           <p:cNvSpPr>
             <a:spLocks noGrp="1"/>
           </p:cNvSpPr>
@@ -92,7 +92,7 @@
       </p:sp>
       <p:sp>
         <p:nvSpPr>
-          <p:cNvPr id="64" name="PlaceHolder 2"/>
+          <p:cNvPr id="57" name="PlaceHolder 2"/>
           <p:cNvSpPr>
             <a:spLocks noGrp="1"/>
           </p:cNvSpPr>
@@ -141,7 +141,7 @@
       </p:sp>
       <p:sp>
         <p:nvSpPr>
-          <p:cNvPr id="65" name="PlaceHolder 3"/>
+          <p:cNvPr id="58" name="PlaceHolder 3"/>
           <p:cNvSpPr>
             <a:spLocks noGrp="1"/>
           </p:cNvSpPr>
@@ -190,7 +190,7 @@
       </p:sp>
       <p:sp>
         <p:nvSpPr>
-          <p:cNvPr id="66" name="PlaceHolder 4"/>
+          <p:cNvPr id="59" name="PlaceHolder 4"/>
           <p:cNvSpPr>
             <a:spLocks noGrp="1"/>
           </p:cNvSpPr>
@@ -250,7 +250,7 @@
       </p:sp>
       <p:sp>
         <p:nvSpPr>
-          <p:cNvPr id="67" name="PlaceHolder 5"/>
+          <p:cNvPr id="60" name="PlaceHolder 5"/>
           <p:cNvSpPr>
             <a:spLocks noGrp="1"/>
           </p:cNvSpPr>
@@ -310,7 +310,7 @@
       </p:sp>
       <p:sp>
         <p:nvSpPr>
-          <p:cNvPr id="68" name="PlaceHolder 6"/>
+          <p:cNvPr id="61" name="PlaceHolder 6"/>
           <p:cNvSpPr>
             <a:spLocks noGrp="1"/>
           </p:cNvSpPr>
@@ -350,7 +350,7 @@
             <a:pPr indent="0" algn="r">
               <a:buNone/>
             </a:pPr>
-            <a:fld id="{5FF4D657-3773-4B09-9C2B-A017AF228858}" type="slidenum">
+            <a:fld id="{AE1D12B8-A052-4FED-BA17-224421784624}" type="slidenum">
               <a:rPr b="0" lang="en-US" sz="1400" spc="-1" strike="noStrike">
                 <a:solidFill>
                   <a:srgbClr val="000000"/>
@@ -393,7 +393,7 @@
       </p:grpSpPr>
       <p:sp>
         <p:nvSpPr>
-          <p:cNvPr id="80" name="PlaceHolder 1"/>
+          <p:cNvPr id="73" name="PlaceHolder 1"/>
           <p:cNvSpPr>
             <a:spLocks noGrp="1"/>
           </p:cNvSpPr>
@@ -416,7 +416,7 @@
       </p:sp>
       <p:sp>
         <p:nvSpPr>
-          <p:cNvPr id="81" name="PlaceHolder 2"/>
+          <p:cNvPr id="74" name="PlaceHolder 2"/>
           <p:cNvSpPr>
             <a:spLocks noGrp="1"/>
           </p:cNvSpPr>
@@ -427,7 +427,7 @@
         <p:spPr>
           <a:xfrm>
             <a:off x="685800" y="4400640"/>
-            <a:ext cx="5486040" cy="3600000"/>
+            <a:ext cx="5485680" cy="3599640"/>
           </a:xfrm>
           <a:prstGeom prst="rect">
             <a:avLst/>
@@ -456,7 +456,7 @@
       </p:sp>
       <p:sp>
         <p:nvSpPr>
-          <p:cNvPr id="82" name="PlaceHolder 3"/>
+          <p:cNvPr id="75" name="PlaceHolder 3"/>
           <p:cNvSpPr>
             <a:spLocks noGrp="1"/>
           </p:cNvSpPr>
@@ -467,7 +467,7 @@
         <p:spPr>
           <a:xfrm>
             <a:off x="3884760" y="8685360"/>
-            <a:ext cx="2971440" cy="458280"/>
+            <a:ext cx="2971080" cy="457920"/>
           </a:xfrm>
           <a:prstGeom prst="rect">
             <a:avLst/>
@@ -485,7 +485,7 @@
             <a:pPr indent="0">
               <a:buNone/>
             </a:pPr>
-            <a:endParaRPr b="0" lang="en-US" sz="1200" spc="-1" strike="noStrike">
+            <a:endParaRPr b="0" lang="en-US" sz="1400" spc="-1" strike="noStrike">
               <a:solidFill>
                 <a:srgbClr val="000000"/>
               </a:solidFill>
@@ -540,7 +540,7 @@
       </p:grpSpPr>
       <p:sp>
         <p:nvSpPr>
-          <p:cNvPr id="43" name="PlaceHolder 1"/>
+          <p:cNvPr id="36" name="PlaceHolder 1"/>
           <p:cNvSpPr>
             <a:spLocks noGrp="1"/>
           </p:cNvSpPr>
@@ -551,7 +551,7 @@
         <p:spPr>
           <a:xfrm>
             <a:off x="1523880" y="1122480"/>
-            <a:ext cx="9143280" cy="2386800"/>
+            <a:ext cx="9142920" cy="2386440"/>
           </a:xfrm>
           <a:prstGeom prst="rect">
             <a:avLst/>
@@ -580,7 +580,7 @@
       </p:sp>
       <p:sp>
         <p:nvSpPr>
-          <p:cNvPr id="44" name="PlaceHolder 2"/>
+          <p:cNvPr id="37" name="PlaceHolder 2"/>
           <p:cNvSpPr>
             <a:spLocks noGrp="1"/>
           </p:cNvSpPr>
@@ -623,7 +623,7 @@
       </p:sp>
       <p:sp>
         <p:nvSpPr>
-          <p:cNvPr id="45" name="PlaceHolder 3"/>
+          <p:cNvPr id="38" name="PlaceHolder 3"/>
           <p:cNvSpPr>
             <a:spLocks noGrp="1"/>
           </p:cNvSpPr>
@@ -634,7 +634,7 @@
         <p:spPr>
           <a:xfrm>
             <a:off x="6231960" y="1604520"/>
-            <a:ext cx="5354280" cy="3977280"/>
+            <a:ext cx="5354280" cy="3976920"/>
           </a:xfrm>
           <a:prstGeom prst="rect">
             <a:avLst/>
@@ -666,7 +666,7 @@
       </p:sp>
       <p:sp>
         <p:nvSpPr>
-          <p:cNvPr id="46" name="PlaceHolder 4"/>
+          <p:cNvPr id="39" name="PlaceHolder 4"/>
           <p:cNvSpPr>
             <a:spLocks noGrp="1"/>
           </p:cNvSpPr>
@@ -731,7 +731,7 @@
       </p:grpSpPr>
       <p:sp>
         <p:nvSpPr>
-          <p:cNvPr id="51" name="PlaceHolder 1"/>
+          <p:cNvPr id="44" name="PlaceHolder 1"/>
           <p:cNvSpPr>
             <a:spLocks noGrp="1"/>
           </p:cNvSpPr>
@@ -742,7 +742,7 @@
         <p:spPr>
           <a:xfrm>
             <a:off x="1523880" y="1122480"/>
-            <a:ext cx="9143280" cy="2386800"/>
+            <a:ext cx="9142920" cy="2386440"/>
           </a:xfrm>
           <a:prstGeom prst="rect">
             <a:avLst/>
@@ -771,7 +771,7 @@
       </p:sp>
       <p:sp>
         <p:nvSpPr>
-          <p:cNvPr id="52" name="PlaceHolder 2"/>
+          <p:cNvPr id="45" name="PlaceHolder 2"/>
           <p:cNvSpPr>
             <a:spLocks noGrp="1"/>
           </p:cNvSpPr>
@@ -782,7 +782,7 @@
         <p:spPr>
           <a:xfrm>
             <a:off x="609480" y="1604520"/>
-            <a:ext cx="5354280" cy="3977280"/>
+            <a:ext cx="5354280" cy="3976920"/>
           </a:xfrm>
           <a:prstGeom prst="rect">
             <a:avLst/>
@@ -814,7 +814,7 @@
       </p:sp>
       <p:sp>
         <p:nvSpPr>
-          <p:cNvPr id="53" name="PlaceHolder 3"/>
+          <p:cNvPr id="46" name="PlaceHolder 3"/>
           <p:cNvSpPr>
             <a:spLocks noGrp="1"/>
           </p:cNvSpPr>
@@ -857,7 +857,7 @@
       </p:sp>
       <p:sp>
         <p:nvSpPr>
-          <p:cNvPr id="54" name="PlaceHolder 4"/>
+          <p:cNvPr id="47" name="PlaceHolder 4"/>
           <p:cNvSpPr>
             <a:spLocks noGrp="1"/>
           </p:cNvSpPr>
@@ -922,7 +922,7 @@
       </p:grpSpPr>
       <p:sp>
         <p:nvSpPr>
-          <p:cNvPr id="59" name="PlaceHolder 1"/>
+          <p:cNvPr id="52" name="PlaceHolder 1"/>
           <p:cNvSpPr>
             <a:spLocks noGrp="1"/>
           </p:cNvSpPr>
@@ -933,7 +933,7 @@
         <p:spPr>
           <a:xfrm>
             <a:off x="1523880" y="1122480"/>
-            <a:ext cx="9143280" cy="2386800"/>
+            <a:ext cx="9142920" cy="2386440"/>
           </a:xfrm>
           <a:prstGeom prst="rect">
             <a:avLst/>
@@ -962,7 +962,7 @@
       </p:sp>
       <p:sp>
         <p:nvSpPr>
-          <p:cNvPr id="60" name="PlaceHolder 2"/>
+          <p:cNvPr id="53" name="PlaceHolder 2"/>
           <p:cNvSpPr>
             <a:spLocks noGrp="1"/>
           </p:cNvSpPr>
@@ -1005,7 +1005,7 @@
       </p:sp>
       <p:sp>
         <p:nvSpPr>
-          <p:cNvPr id="61" name="PlaceHolder 3"/>
+          <p:cNvPr id="54" name="PlaceHolder 3"/>
           <p:cNvSpPr>
             <a:spLocks noGrp="1"/>
           </p:cNvSpPr>
@@ -1048,7 +1048,7 @@
       </p:sp>
       <p:sp>
         <p:nvSpPr>
-          <p:cNvPr id="62" name="PlaceHolder 4"/>
+          <p:cNvPr id="55" name="PlaceHolder 4"/>
           <p:cNvSpPr>
             <a:spLocks noGrp="1"/>
           </p:cNvSpPr>
@@ -1059,7 +1059,7 @@
         <p:spPr>
           <a:xfrm>
             <a:off x="609480" y="3682080"/>
-            <a:ext cx="10972440" cy="1896840"/>
+            <a:ext cx="10972080" cy="1896840"/>
           </a:xfrm>
           <a:prstGeom prst="rect">
             <a:avLst/>
@@ -1124,7 +1124,7 @@
         <p:spPr>
           <a:xfrm>
             <a:off x="1523880" y="1122480"/>
-            <a:ext cx="9143280" cy="2386800"/>
+            <a:ext cx="9142920" cy="2386440"/>
           </a:xfrm>
           <a:prstGeom prst="rect">
             <a:avLst/>
@@ -1164,7 +1164,7 @@
         <p:spPr>
           <a:xfrm>
             <a:off x="609480" y="1604520"/>
-            <a:ext cx="10972440" cy="1896840"/>
+            <a:ext cx="10972080" cy="1896840"/>
           </a:xfrm>
           <a:prstGeom prst="rect">
             <a:avLst/>
@@ -1207,7 +1207,7 @@
         <p:spPr>
           <a:xfrm>
             <a:off x="609480" y="3682080"/>
-            <a:ext cx="10972440" cy="1896840"/>
+            <a:ext cx="10972080" cy="1896840"/>
           </a:xfrm>
           <a:prstGeom prst="rect">
             <a:avLst/>
@@ -1272,7 +1272,7 @@
         <p:spPr>
           <a:xfrm>
             <a:off x="1523880" y="1122480"/>
-            <a:ext cx="9143280" cy="2386800"/>
+            <a:ext cx="9142920" cy="2386440"/>
           </a:xfrm>
           <a:prstGeom prst="rect">
             <a:avLst/>
@@ -1517,7 +1517,7 @@
       </p:grpSpPr>
       <p:sp>
         <p:nvSpPr>
-          <p:cNvPr id="25" name="PlaceHolder 1"/>
+          <p:cNvPr id="18" name="PlaceHolder 1"/>
           <p:cNvSpPr>
             <a:spLocks noGrp="1"/>
           </p:cNvSpPr>
@@ -1528,7 +1528,7 @@
         <p:spPr>
           <a:xfrm>
             <a:off x="1523880" y="1122480"/>
-            <a:ext cx="9143280" cy="2386800"/>
+            <a:ext cx="9142920" cy="2386440"/>
           </a:xfrm>
           <a:prstGeom prst="rect">
             <a:avLst/>
@@ -1557,7 +1557,7 @@
       </p:sp>
       <p:sp>
         <p:nvSpPr>
-          <p:cNvPr id="26" name="PlaceHolder 2"/>
+          <p:cNvPr id="19" name="PlaceHolder 2"/>
           <p:cNvSpPr>
             <a:spLocks noGrp="1"/>
           </p:cNvSpPr>
@@ -1568,7 +1568,7 @@
         <p:spPr>
           <a:xfrm>
             <a:off x="609480" y="1604520"/>
-            <a:ext cx="10972440" cy="3977280"/>
+            <a:ext cx="10972080" cy="3976920"/>
           </a:xfrm>
           <a:prstGeom prst="rect">
             <a:avLst/>
@@ -1622,7 +1622,7 @@
       </p:grpSpPr>
       <p:sp>
         <p:nvSpPr>
-          <p:cNvPr id="29" name="PlaceHolder 1"/>
+          <p:cNvPr id="22" name="PlaceHolder 1"/>
           <p:cNvSpPr>
             <a:spLocks noGrp="1"/>
           </p:cNvSpPr>
@@ -1633,7 +1633,7 @@
         <p:spPr>
           <a:xfrm>
             <a:off x="1523880" y="1122480"/>
-            <a:ext cx="9143280" cy="2386800"/>
+            <a:ext cx="9142920" cy="2386440"/>
           </a:xfrm>
           <a:prstGeom prst="rect">
             <a:avLst/>
@@ -1662,7 +1662,7 @@
       </p:sp>
       <p:sp>
         <p:nvSpPr>
-          <p:cNvPr id="30" name="PlaceHolder 2"/>
+          <p:cNvPr id="23" name="PlaceHolder 2"/>
           <p:cNvSpPr>
             <a:spLocks noGrp="1"/>
           </p:cNvSpPr>
@@ -1673,7 +1673,7 @@
         <p:spPr>
           <a:xfrm>
             <a:off x="609480" y="1604520"/>
-            <a:ext cx="10972440" cy="3977280"/>
+            <a:ext cx="10972080" cy="3976920"/>
           </a:xfrm>
           <a:prstGeom prst="rect">
             <a:avLst/>
@@ -1727,7 +1727,7 @@
       </p:grpSpPr>
       <p:sp>
         <p:nvSpPr>
-          <p:cNvPr id="34" name="PlaceHolder 1"/>
+          <p:cNvPr id="27" name="PlaceHolder 1"/>
           <p:cNvSpPr>
             <a:spLocks noGrp="1"/>
           </p:cNvSpPr>
@@ -1738,7 +1738,7 @@
         <p:spPr>
           <a:xfrm>
             <a:off x="1523880" y="1122480"/>
-            <a:ext cx="9143280" cy="2386800"/>
+            <a:ext cx="9142920" cy="2386440"/>
           </a:xfrm>
           <a:prstGeom prst="rect">
             <a:avLst/>
@@ -1767,7 +1767,7 @@
       </p:sp>
       <p:sp>
         <p:nvSpPr>
-          <p:cNvPr id="35" name="PlaceHolder 2"/>
+          <p:cNvPr id="28" name="PlaceHolder 2"/>
           <p:cNvSpPr>
             <a:spLocks noGrp="1"/>
           </p:cNvSpPr>
@@ -1778,7 +1778,7 @@
         <p:spPr>
           <a:xfrm>
             <a:off x="609480" y="1604520"/>
-            <a:ext cx="5354280" cy="3977280"/>
+            <a:ext cx="5354280" cy="3976920"/>
           </a:xfrm>
           <a:prstGeom prst="rect">
             <a:avLst/>
@@ -1810,7 +1810,7 @@
       </p:sp>
       <p:sp>
         <p:nvSpPr>
-          <p:cNvPr id="36" name="PlaceHolder 3"/>
+          <p:cNvPr id="29" name="PlaceHolder 3"/>
           <p:cNvSpPr>
             <a:spLocks noGrp="1"/>
           </p:cNvSpPr>
@@ -1821,7 +1821,7 @@
         <p:spPr>
           <a:xfrm>
             <a:off x="6231960" y="1604520"/>
-            <a:ext cx="5354280" cy="3977280"/>
+            <a:ext cx="5354280" cy="3976920"/>
           </a:xfrm>
           <a:prstGeom prst="rect">
             <a:avLst/>
@@ -1875,7 +1875,7 @@
       </p:grpSpPr>
       <p:sp>
         <p:nvSpPr>
-          <p:cNvPr id="38" name="PlaceHolder 1"/>
+          <p:cNvPr id="31" name="PlaceHolder 1"/>
           <p:cNvSpPr>
             <a:spLocks noGrp="1"/>
           </p:cNvSpPr>
@@ -1886,7 +1886,7 @@
         <p:spPr>
           <a:xfrm>
             <a:off x="1523880" y="1122480"/>
-            <a:ext cx="9143280" cy="2386800"/>
+            <a:ext cx="9142920" cy="2386440"/>
           </a:xfrm>
           <a:prstGeom prst="rect">
             <a:avLst/>
@@ -1919,7 +1919,7 @@
 </file>
 
 <file path=ppt/slideLayouts/slideLayout9.xml><?xml version="1.0" encoding="utf-8"?>
-<p:sldLayout xmlns:a="http://schemas.openxmlformats.org/drawingml/2006/main" xmlns:p="http://schemas.openxmlformats.org/presentationml/2006/main" xmlns:r="http://schemas.openxmlformats.org/officeDocument/2006/relationships" xmlns:p14="http://schemas.microsoft.com/office/powerpoint/2010/main" xmlns:p15="http://schemas.microsoft.com/office/powerpoint/2012/main" xmlns:mc="http://schemas.openxmlformats.org/markup-compatibility/2006" type="mediaAndTx" preserve="1">
+<p:sldLayout xmlns:a="http://schemas.openxmlformats.org/drawingml/2006/main" xmlns:p="http://schemas.openxmlformats.org/presentationml/2006/main" xmlns:r="http://schemas.openxmlformats.org/officeDocument/2006/relationships" xmlns:p14="http://schemas.microsoft.com/office/powerpoint/2010/main" xmlns:p15="http://schemas.microsoft.com/office/powerpoint/2012/main" xmlns:mc="http://schemas.openxmlformats.org/markup-compatibility/2006" type="blank" preserve="1">
   <p:cSld name="Centered Text">
     <p:spTree>
       <p:nvGrpSpPr>
@@ -1999,7 +1999,7 @@
       </p:grpSpPr>
       <p:sp>
         <p:nvSpPr>
-          <p:cNvPr id="39" name="PlaceHolder 1"/>
+          <p:cNvPr id="32" name="PlaceHolder 1"/>
           <p:cNvSpPr>
             <a:spLocks noGrp="1"/>
           </p:cNvSpPr>
@@ -2010,7 +2010,7 @@
         <p:spPr>
           <a:xfrm>
             <a:off x="1523880" y="1122480"/>
-            <a:ext cx="9143280" cy="2386800"/>
+            <a:ext cx="9142920" cy="2386440"/>
           </a:xfrm>
           <a:prstGeom prst="rect">
             <a:avLst/>
@@ -2048,7 +2048,7 @@
       </p:sp>
       <p:sp>
         <p:nvSpPr>
-          <p:cNvPr id="40" name="PlaceHolder 2"/>
+          <p:cNvPr id="33" name="PlaceHolder 2"/>
           <p:cNvSpPr>
             <a:spLocks noGrp="1"/>
           </p:cNvSpPr>
@@ -2273,7 +2273,7 @@
       </p:sp>
       <p:sp>
         <p:nvSpPr>
-          <p:cNvPr id="41" name="PlaceHolder 3"/>
+          <p:cNvPr id="34" name="PlaceHolder 3"/>
           <p:cNvSpPr>
             <a:spLocks noGrp="1"/>
           </p:cNvSpPr>
@@ -2498,7 +2498,7 @@
       </p:sp>
       <p:sp>
         <p:nvSpPr>
-          <p:cNvPr id="42" name="PlaceHolder 4"/>
+          <p:cNvPr id="35" name="PlaceHolder 4"/>
           <p:cNvSpPr>
             <a:spLocks noGrp="1"/>
           </p:cNvSpPr>
@@ -2756,7 +2756,7 @@
       </p:grpSpPr>
       <p:sp>
         <p:nvSpPr>
-          <p:cNvPr id="47" name="PlaceHolder 1"/>
+          <p:cNvPr id="40" name="PlaceHolder 1"/>
           <p:cNvSpPr>
             <a:spLocks noGrp="1"/>
           </p:cNvSpPr>
@@ -2767,7 +2767,7 @@
         <p:spPr>
           <a:xfrm>
             <a:off x="1523880" y="1122480"/>
-            <a:ext cx="9143280" cy="2386800"/>
+            <a:ext cx="9142920" cy="2386440"/>
           </a:xfrm>
           <a:prstGeom prst="rect">
             <a:avLst/>
@@ -2805,7 +2805,7 @@
       </p:sp>
       <p:sp>
         <p:nvSpPr>
-          <p:cNvPr id="48" name="PlaceHolder 2"/>
+          <p:cNvPr id="41" name="PlaceHolder 2"/>
           <p:cNvSpPr>
             <a:spLocks noGrp="1"/>
           </p:cNvSpPr>
@@ -3030,7 +3030,7 @@
       </p:sp>
       <p:sp>
         <p:nvSpPr>
-          <p:cNvPr id="49" name="PlaceHolder 3"/>
+          <p:cNvPr id="42" name="PlaceHolder 3"/>
           <p:cNvSpPr>
             <a:spLocks noGrp="1"/>
           </p:cNvSpPr>
@@ -3255,7 +3255,7 @@
       </p:sp>
       <p:sp>
         <p:nvSpPr>
-          <p:cNvPr id="50" name="PlaceHolder 4"/>
+          <p:cNvPr id="43" name="PlaceHolder 4"/>
           <p:cNvSpPr>
             <a:spLocks noGrp="1"/>
           </p:cNvSpPr>
@@ -3513,7 +3513,7 @@
       </p:grpSpPr>
       <p:sp>
         <p:nvSpPr>
-          <p:cNvPr id="55" name="PlaceHolder 1"/>
+          <p:cNvPr id="48" name="PlaceHolder 1"/>
           <p:cNvSpPr>
             <a:spLocks noGrp="1"/>
           </p:cNvSpPr>
@@ -3524,7 +3524,7 @@
         <p:spPr>
           <a:xfrm>
             <a:off x="1523880" y="1122480"/>
-            <a:ext cx="9143280" cy="2386800"/>
+            <a:ext cx="9142920" cy="2386440"/>
           </a:xfrm>
           <a:prstGeom prst="rect">
             <a:avLst/>
@@ -3562,7 +3562,7 @@
       </p:sp>
       <p:sp>
         <p:nvSpPr>
-          <p:cNvPr id="56" name="PlaceHolder 2"/>
+          <p:cNvPr id="49" name="PlaceHolder 2"/>
           <p:cNvSpPr>
             <a:spLocks noGrp="1"/>
           </p:cNvSpPr>
@@ -3787,7 +3787,7 @@
       </p:sp>
       <p:sp>
         <p:nvSpPr>
-          <p:cNvPr id="57" name="PlaceHolder 3"/>
+          <p:cNvPr id="50" name="PlaceHolder 3"/>
           <p:cNvSpPr>
             <a:spLocks noGrp="1"/>
           </p:cNvSpPr>
@@ -4012,7 +4012,7 @@
       </p:sp>
       <p:sp>
         <p:nvSpPr>
-          <p:cNvPr id="58" name="PlaceHolder 4"/>
+          <p:cNvPr id="51" name="PlaceHolder 4"/>
           <p:cNvSpPr>
             <a:spLocks noGrp="1"/>
           </p:cNvSpPr>
@@ -4281,7 +4281,7 @@
         <p:spPr>
           <a:xfrm>
             <a:off x="1523880" y="1122480"/>
-            <a:ext cx="9143280" cy="2386800"/>
+            <a:ext cx="9142920" cy="2386440"/>
           </a:xfrm>
           <a:prstGeom prst="rect">
             <a:avLst/>
@@ -4813,7 +4813,7 @@
         <p:spPr>
           <a:xfrm>
             <a:off x="1523880" y="1122480"/>
-            <a:ext cx="9143280" cy="2386800"/>
+            <a:ext cx="9142920" cy="2386440"/>
           </a:xfrm>
           <a:prstGeom prst="rect">
             <a:avLst/>
@@ -5759,6 +5759,39 @@
 </file>
 
 <file path=ppt/slideMasters/slideMaster4.xml><?xml version="1.0" encoding="utf-8"?>
+<p:sldMaster xmlns:a="http://schemas.openxmlformats.org/drawingml/2006/main" xmlns:p="http://schemas.openxmlformats.org/presentationml/2006/main" xmlns:r="http://schemas.openxmlformats.org/officeDocument/2006/relationships" xmlns:p14="http://schemas.microsoft.com/office/powerpoint/2010/main" xmlns:p15="http://schemas.microsoft.com/office/powerpoint/2012/main" xmlns:mc="http://schemas.openxmlformats.org/markup-compatibility/2006">
+  <p:cSld>
+    <p:bg>
+      <p:bgPr>
+        <a:solidFill>
+          <a:srgbClr val="ffffff"/>
+        </a:solidFill>
+      </p:bgPr>
+    </p:bg>
+    <p:spTree>
+      <p:nvGrpSpPr>
+        <p:cNvPr id="1" name=""/>
+        <p:cNvGrpSpPr/>
+        <p:nvPr/>
+      </p:nvGrpSpPr>
+      <p:grpSpPr>
+        <a:xfrm>
+          <a:off x="0" y="0"/>
+          <a:ext cx="0" cy="0"/>
+          <a:chOff x="0" y="0"/>
+          <a:chExt cx="0" cy="0"/>
+        </a:xfrm>
+      </p:grpSpPr>
+    </p:spTree>
+  </p:cSld>
+  <p:clrMap bg1="lt1" bg2="lt2" tx1="dk1" tx2="dk2" accent1="accent1" accent2="accent2" accent3="accent3" accent4="accent4" accent5="accent5" accent6="accent6" hlink="hlink" folHlink="folHlink"/>
+  <p:sldLayoutIdLst>
+    <p:sldLayoutId id="2147483655" r:id="rId2"/>
+  </p:sldLayoutIdLst>
+</p:sldMaster>
+</file>
+
+<file path=ppt/slideMasters/slideMaster5.xml><?xml version="1.0" encoding="utf-8"?>
 <p:sldMaster xmlns:a="http://schemas.openxmlformats.org/drawingml/2006/main" xmlns:p="http://schemas.openxmlformats.org/presentationml/2006/main" xmlns:r="http://schemas.openxmlformats.org/officeDocument/2006/relationships" xmlns:p14="http://schemas.microsoft.com/office/powerpoint/2010/main" xmlns:p15="http://schemas.microsoft.com/office/powerpoint/2012/main" xmlns:mc="http://schemas.openxmlformats.org/markup-compatibility/2006">
   <p:cSld>
     <p:bg>
@@ -5795,7 +5828,7 @@
         <p:spPr>
           <a:xfrm>
             <a:off x="1523880" y="1122480"/>
-            <a:ext cx="9143280" cy="2386800"/>
+            <a:ext cx="9142920" cy="2386440"/>
           </a:xfrm>
           <a:prstGeom prst="rect">
             <a:avLst/>
@@ -5844,1439 +5877,7 @@
         <p:spPr>
           <a:xfrm>
             <a:off x="609480" y="1604520"/>
-            <a:ext cx="3532680" cy="1896480"/>
-          </a:xfrm>
-          <a:prstGeom prst="rect">
-            <a:avLst/>
-          </a:prstGeom>
-          <a:noFill/>
-          <a:ln w="0">
-            <a:noFill/>
-          </a:ln>
-        </p:spPr>
-        <p:txBody>
-          <a:bodyPr lIns="0" rIns="0" tIns="0" bIns="0" anchor="t">
-            <a:normAutofit fontScale="62222" lnSpcReduction="20000"/>
-          </a:bodyPr>
-          <a:p>
-            <a:pPr marL="432000" indent="-324000">
-              <a:spcBef>
-                <a:spcPts val="1417"/>
-              </a:spcBef>
-              <a:buClr>
-                <a:srgbClr val="000000"/>
-              </a:buClr>
-              <a:buSzPct val="45000"/>
-              <a:buFont typeface="Wingdings" charset="2"/>
-              <a:buChar char=""/>
-            </a:pPr>
-            <a:r>
-              <a:rPr b="0" lang="en-US" sz="1800" spc="-1" strike="noStrike">
-                <a:solidFill>
-                  <a:srgbClr val="000000"/>
-                </a:solidFill>
-                <a:latin typeface="Arial"/>
-              </a:rPr>
-              <a:t>Click to edit the outline text format</a:t>
-            </a:r>
-            <a:endParaRPr b="0" lang="en-US" sz="1800" spc="-1" strike="noStrike">
-              <a:solidFill>
-                <a:srgbClr val="000000"/>
-              </a:solidFill>
-              <a:latin typeface="Arial"/>
-            </a:endParaRPr>
-          </a:p>
-          <a:p>
-            <a:pPr lvl="1" marL="864000" indent="-324000">
-              <a:spcBef>
-                <a:spcPts val="1134"/>
-              </a:spcBef>
-              <a:buClr>
-                <a:srgbClr val="000000"/>
-              </a:buClr>
-              <a:buSzPct val="75000"/>
-              <a:buFont typeface="Symbol" charset="2"/>
-              <a:buChar char=""/>
-            </a:pPr>
-            <a:r>
-              <a:rPr b="0" lang="en-US" sz="1800" spc="-1" strike="noStrike">
-                <a:solidFill>
-                  <a:srgbClr val="000000"/>
-                </a:solidFill>
-                <a:latin typeface="Arial"/>
-              </a:rPr>
-              <a:t>Second Outline Level</a:t>
-            </a:r>
-            <a:endParaRPr b="0" lang="en-US" sz="1800" spc="-1" strike="noStrike">
-              <a:solidFill>
-                <a:srgbClr val="000000"/>
-              </a:solidFill>
-              <a:latin typeface="Arial"/>
-            </a:endParaRPr>
-          </a:p>
-          <a:p>
-            <a:pPr lvl="2" marL="1296000" indent="-288000">
-              <a:spcBef>
-                <a:spcPts val="850"/>
-              </a:spcBef>
-              <a:buClr>
-                <a:srgbClr val="000000"/>
-              </a:buClr>
-              <a:buSzPct val="45000"/>
-              <a:buFont typeface="Wingdings" charset="2"/>
-              <a:buChar char=""/>
-            </a:pPr>
-            <a:r>
-              <a:rPr b="0" lang="en-US" sz="1800" spc="-1" strike="noStrike">
-                <a:solidFill>
-                  <a:srgbClr val="000000"/>
-                </a:solidFill>
-                <a:latin typeface="Arial"/>
-              </a:rPr>
-              <a:t>Third Outline Level</a:t>
-            </a:r>
-            <a:endParaRPr b="0" lang="en-US" sz="1800" spc="-1" strike="noStrike">
-              <a:solidFill>
-                <a:srgbClr val="000000"/>
-              </a:solidFill>
-              <a:latin typeface="Arial"/>
-            </a:endParaRPr>
-          </a:p>
-          <a:p>
-            <a:pPr lvl="3" marL="1728000" indent="-216000">
-              <a:spcBef>
-                <a:spcPts val="567"/>
-              </a:spcBef>
-              <a:buClr>
-                <a:srgbClr val="000000"/>
-              </a:buClr>
-              <a:buSzPct val="75000"/>
-              <a:buFont typeface="Symbol" charset="2"/>
-              <a:buChar char=""/>
-            </a:pPr>
-            <a:r>
-              <a:rPr b="0" lang="en-US" sz="1800" spc="-1" strike="noStrike">
-                <a:solidFill>
-                  <a:srgbClr val="000000"/>
-                </a:solidFill>
-                <a:latin typeface="Arial"/>
-              </a:rPr>
-              <a:t>Fourth Outline Level</a:t>
-            </a:r>
-            <a:endParaRPr b="0" lang="en-US" sz="1800" spc="-1" strike="noStrike">
-              <a:solidFill>
-                <a:srgbClr val="000000"/>
-              </a:solidFill>
-              <a:latin typeface="Arial"/>
-            </a:endParaRPr>
-          </a:p>
-          <a:p>
-            <a:pPr lvl="4" marL="2160000" indent="-216000">
-              <a:spcBef>
-                <a:spcPts val="283"/>
-              </a:spcBef>
-              <a:buClr>
-                <a:srgbClr val="000000"/>
-              </a:buClr>
-              <a:buSzPct val="45000"/>
-              <a:buFont typeface="Wingdings" charset="2"/>
-              <a:buChar char=""/>
-            </a:pPr>
-            <a:r>
-              <a:rPr b="0" lang="en-US" sz="1800" spc="-1" strike="noStrike">
-                <a:solidFill>
-                  <a:srgbClr val="000000"/>
-                </a:solidFill>
-                <a:latin typeface="Arial"/>
-              </a:rPr>
-              <a:t>Fifth Outline Level</a:t>
-            </a:r>
-            <a:endParaRPr b="0" lang="en-US" sz="1800" spc="-1" strike="noStrike">
-              <a:solidFill>
-                <a:srgbClr val="000000"/>
-              </a:solidFill>
-              <a:latin typeface="Arial"/>
-            </a:endParaRPr>
-          </a:p>
-          <a:p>
-            <a:pPr lvl="5" marL="2592000" indent="-216000">
-              <a:spcBef>
-                <a:spcPts val="283"/>
-              </a:spcBef>
-              <a:buClr>
-                <a:srgbClr val="000000"/>
-              </a:buClr>
-              <a:buSzPct val="45000"/>
-              <a:buFont typeface="Wingdings" charset="2"/>
-              <a:buChar char=""/>
-            </a:pPr>
-            <a:r>
-              <a:rPr b="0" lang="en-US" sz="1800" spc="-1" strike="noStrike">
-                <a:solidFill>
-                  <a:srgbClr val="000000"/>
-                </a:solidFill>
-                <a:latin typeface="Arial"/>
-              </a:rPr>
-              <a:t>Sixth Outline Level</a:t>
-            </a:r>
-            <a:endParaRPr b="0" lang="en-US" sz="1800" spc="-1" strike="noStrike">
-              <a:solidFill>
-                <a:srgbClr val="000000"/>
-              </a:solidFill>
-              <a:latin typeface="Arial"/>
-            </a:endParaRPr>
-          </a:p>
-          <a:p>
-            <a:pPr lvl="6" marL="3024000" indent="-216000">
-              <a:spcBef>
-                <a:spcPts val="283"/>
-              </a:spcBef>
-              <a:buClr>
-                <a:srgbClr val="000000"/>
-              </a:buClr>
-              <a:buSzPct val="45000"/>
-              <a:buFont typeface="Wingdings" charset="2"/>
-              <a:buChar char=""/>
-            </a:pPr>
-            <a:r>
-              <a:rPr b="0" lang="en-US" sz="1800" spc="-1" strike="noStrike">
-                <a:solidFill>
-                  <a:srgbClr val="000000"/>
-                </a:solidFill>
-                <a:latin typeface="Arial"/>
-              </a:rPr>
-              <a:t>Seventh Outline Level</a:t>
-            </a:r>
-            <a:endParaRPr b="0" lang="en-US" sz="1800" spc="-1" strike="noStrike">
-              <a:solidFill>
-                <a:srgbClr val="000000"/>
-              </a:solidFill>
-              <a:latin typeface="Arial"/>
-            </a:endParaRPr>
-          </a:p>
-        </p:txBody>
-      </p:sp>
-      <p:sp>
-        <p:nvSpPr>
-          <p:cNvPr id="18" name="PlaceHolder 3"/>
-          <p:cNvSpPr>
-            <a:spLocks noGrp="1"/>
-          </p:cNvSpPr>
-          <p:nvPr>
-            <p:ph type="body"/>
-          </p:nvPr>
-        </p:nvSpPr>
-        <p:spPr>
-          <a:xfrm>
-            <a:off x="4319640" y="1604520"/>
-            <a:ext cx="3532680" cy="1896480"/>
-          </a:xfrm>
-          <a:prstGeom prst="rect">
-            <a:avLst/>
-          </a:prstGeom>
-          <a:noFill/>
-          <a:ln w="0">
-            <a:noFill/>
-          </a:ln>
-        </p:spPr>
-        <p:txBody>
-          <a:bodyPr lIns="0" rIns="0" tIns="0" bIns="0" anchor="t">
-            <a:normAutofit fontScale="62222" lnSpcReduction="20000"/>
-          </a:bodyPr>
-          <a:p>
-            <a:pPr marL="432000" indent="-324000">
-              <a:spcBef>
-                <a:spcPts val="1417"/>
-              </a:spcBef>
-              <a:buClr>
-                <a:srgbClr val="000000"/>
-              </a:buClr>
-              <a:buSzPct val="45000"/>
-              <a:buFont typeface="Wingdings" charset="2"/>
-              <a:buChar char=""/>
-            </a:pPr>
-            <a:r>
-              <a:rPr b="0" lang="en-US" sz="1800" spc="-1" strike="noStrike">
-                <a:solidFill>
-                  <a:srgbClr val="000000"/>
-                </a:solidFill>
-                <a:latin typeface="Arial"/>
-              </a:rPr>
-              <a:t>Click to edit the outline text format</a:t>
-            </a:r>
-            <a:endParaRPr b="0" lang="en-US" sz="1800" spc="-1" strike="noStrike">
-              <a:solidFill>
-                <a:srgbClr val="000000"/>
-              </a:solidFill>
-              <a:latin typeface="Arial"/>
-            </a:endParaRPr>
-          </a:p>
-          <a:p>
-            <a:pPr lvl="1" marL="864000" indent="-324000">
-              <a:spcBef>
-                <a:spcPts val="1134"/>
-              </a:spcBef>
-              <a:buClr>
-                <a:srgbClr val="000000"/>
-              </a:buClr>
-              <a:buSzPct val="75000"/>
-              <a:buFont typeface="Symbol" charset="2"/>
-              <a:buChar char=""/>
-            </a:pPr>
-            <a:r>
-              <a:rPr b="0" lang="en-US" sz="1800" spc="-1" strike="noStrike">
-                <a:solidFill>
-                  <a:srgbClr val="000000"/>
-                </a:solidFill>
-                <a:latin typeface="Arial"/>
-              </a:rPr>
-              <a:t>Second Outline Level</a:t>
-            </a:r>
-            <a:endParaRPr b="0" lang="en-US" sz="1800" spc="-1" strike="noStrike">
-              <a:solidFill>
-                <a:srgbClr val="000000"/>
-              </a:solidFill>
-              <a:latin typeface="Arial"/>
-            </a:endParaRPr>
-          </a:p>
-          <a:p>
-            <a:pPr lvl="2" marL="1296000" indent="-288000">
-              <a:spcBef>
-                <a:spcPts val="850"/>
-              </a:spcBef>
-              <a:buClr>
-                <a:srgbClr val="000000"/>
-              </a:buClr>
-              <a:buSzPct val="45000"/>
-              <a:buFont typeface="Wingdings" charset="2"/>
-              <a:buChar char=""/>
-            </a:pPr>
-            <a:r>
-              <a:rPr b="0" lang="en-US" sz="1800" spc="-1" strike="noStrike">
-                <a:solidFill>
-                  <a:srgbClr val="000000"/>
-                </a:solidFill>
-                <a:latin typeface="Arial"/>
-              </a:rPr>
-              <a:t>Third Outline Level</a:t>
-            </a:r>
-            <a:endParaRPr b="0" lang="en-US" sz="1800" spc="-1" strike="noStrike">
-              <a:solidFill>
-                <a:srgbClr val="000000"/>
-              </a:solidFill>
-              <a:latin typeface="Arial"/>
-            </a:endParaRPr>
-          </a:p>
-          <a:p>
-            <a:pPr lvl="3" marL="1728000" indent="-216000">
-              <a:spcBef>
-                <a:spcPts val="567"/>
-              </a:spcBef>
-              <a:buClr>
-                <a:srgbClr val="000000"/>
-              </a:buClr>
-              <a:buSzPct val="75000"/>
-              <a:buFont typeface="Symbol" charset="2"/>
-              <a:buChar char=""/>
-            </a:pPr>
-            <a:r>
-              <a:rPr b="0" lang="en-US" sz="1800" spc="-1" strike="noStrike">
-                <a:solidFill>
-                  <a:srgbClr val="000000"/>
-                </a:solidFill>
-                <a:latin typeface="Arial"/>
-              </a:rPr>
-              <a:t>Fourth Outline Level</a:t>
-            </a:r>
-            <a:endParaRPr b="0" lang="en-US" sz="1800" spc="-1" strike="noStrike">
-              <a:solidFill>
-                <a:srgbClr val="000000"/>
-              </a:solidFill>
-              <a:latin typeface="Arial"/>
-            </a:endParaRPr>
-          </a:p>
-          <a:p>
-            <a:pPr lvl="4" marL="2160000" indent="-216000">
-              <a:spcBef>
-                <a:spcPts val="283"/>
-              </a:spcBef>
-              <a:buClr>
-                <a:srgbClr val="000000"/>
-              </a:buClr>
-              <a:buSzPct val="45000"/>
-              <a:buFont typeface="Wingdings" charset="2"/>
-              <a:buChar char=""/>
-            </a:pPr>
-            <a:r>
-              <a:rPr b="0" lang="en-US" sz="1800" spc="-1" strike="noStrike">
-                <a:solidFill>
-                  <a:srgbClr val="000000"/>
-                </a:solidFill>
-                <a:latin typeface="Arial"/>
-              </a:rPr>
-              <a:t>Fifth Outline Level</a:t>
-            </a:r>
-            <a:endParaRPr b="0" lang="en-US" sz="1800" spc="-1" strike="noStrike">
-              <a:solidFill>
-                <a:srgbClr val="000000"/>
-              </a:solidFill>
-              <a:latin typeface="Arial"/>
-            </a:endParaRPr>
-          </a:p>
-          <a:p>
-            <a:pPr lvl="5" marL="2592000" indent="-216000">
-              <a:spcBef>
-                <a:spcPts val="283"/>
-              </a:spcBef>
-              <a:buClr>
-                <a:srgbClr val="000000"/>
-              </a:buClr>
-              <a:buSzPct val="45000"/>
-              <a:buFont typeface="Wingdings" charset="2"/>
-              <a:buChar char=""/>
-            </a:pPr>
-            <a:r>
-              <a:rPr b="0" lang="en-US" sz="1800" spc="-1" strike="noStrike">
-                <a:solidFill>
-                  <a:srgbClr val="000000"/>
-                </a:solidFill>
-                <a:latin typeface="Arial"/>
-              </a:rPr>
-              <a:t>Sixth Outline Level</a:t>
-            </a:r>
-            <a:endParaRPr b="0" lang="en-US" sz="1800" spc="-1" strike="noStrike">
-              <a:solidFill>
-                <a:srgbClr val="000000"/>
-              </a:solidFill>
-              <a:latin typeface="Arial"/>
-            </a:endParaRPr>
-          </a:p>
-          <a:p>
-            <a:pPr lvl="6" marL="3024000" indent="-216000">
-              <a:spcBef>
-                <a:spcPts val="283"/>
-              </a:spcBef>
-              <a:buClr>
-                <a:srgbClr val="000000"/>
-              </a:buClr>
-              <a:buSzPct val="45000"/>
-              <a:buFont typeface="Wingdings" charset="2"/>
-              <a:buChar char=""/>
-            </a:pPr>
-            <a:r>
-              <a:rPr b="0" lang="en-US" sz="1800" spc="-1" strike="noStrike">
-                <a:solidFill>
-                  <a:srgbClr val="000000"/>
-                </a:solidFill>
-                <a:latin typeface="Arial"/>
-              </a:rPr>
-              <a:t>Seventh Outline Level</a:t>
-            </a:r>
-            <a:endParaRPr b="0" lang="en-US" sz="1800" spc="-1" strike="noStrike">
-              <a:solidFill>
-                <a:srgbClr val="000000"/>
-              </a:solidFill>
-              <a:latin typeface="Arial"/>
-            </a:endParaRPr>
-          </a:p>
-        </p:txBody>
-      </p:sp>
-      <p:sp>
-        <p:nvSpPr>
-          <p:cNvPr id="19" name="PlaceHolder 4"/>
-          <p:cNvSpPr>
-            <a:spLocks noGrp="1"/>
-          </p:cNvSpPr>
-          <p:nvPr>
-            <p:ph type="body"/>
-          </p:nvPr>
-        </p:nvSpPr>
-        <p:spPr>
-          <a:xfrm>
-            <a:off x="8029800" y="1604520"/>
-            <a:ext cx="3532680" cy="1896480"/>
-          </a:xfrm>
-          <a:prstGeom prst="rect">
-            <a:avLst/>
-          </a:prstGeom>
-          <a:noFill/>
-          <a:ln w="0">
-            <a:noFill/>
-          </a:ln>
-        </p:spPr>
-        <p:txBody>
-          <a:bodyPr lIns="0" rIns="0" tIns="0" bIns="0" anchor="t">
-            <a:normAutofit fontScale="62222" lnSpcReduction="20000"/>
-          </a:bodyPr>
-          <a:p>
-            <a:pPr marL="432000" indent="-324000">
-              <a:spcBef>
-                <a:spcPts val="1417"/>
-              </a:spcBef>
-              <a:buClr>
-                <a:srgbClr val="000000"/>
-              </a:buClr>
-              <a:buSzPct val="45000"/>
-              <a:buFont typeface="Wingdings" charset="2"/>
-              <a:buChar char=""/>
-            </a:pPr>
-            <a:r>
-              <a:rPr b="0" lang="en-US" sz="1800" spc="-1" strike="noStrike">
-                <a:solidFill>
-                  <a:srgbClr val="000000"/>
-                </a:solidFill>
-                <a:latin typeface="Arial"/>
-              </a:rPr>
-              <a:t>Click to edit the outline text format</a:t>
-            </a:r>
-            <a:endParaRPr b="0" lang="en-US" sz="1800" spc="-1" strike="noStrike">
-              <a:solidFill>
-                <a:srgbClr val="000000"/>
-              </a:solidFill>
-              <a:latin typeface="Arial"/>
-            </a:endParaRPr>
-          </a:p>
-          <a:p>
-            <a:pPr lvl="1" marL="864000" indent="-324000">
-              <a:spcBef>
-                <a:spcPts val="1134"/>
-              </a:spcBef>
-              <a:buClr>
-                <a:srgbClr val="000000"/>
-              </a:buClr>
-              <a:buSzPct val="75000"/>
-              <a:buFont typeface="Symbol" charset="2"/>
-              <a:buChar char=""/>
-            </a:pPr>
-            <a:r>
-              <a:rPr b="0" lang="en-US" sz="1800" spc="-1" strike="noStrike">
-                <a:solidFill>
-                  <a:srgbClr val="000000"/>
-                </a:solidFill>
-                <a:latin typeface="Arial"/>
-              </a:rPr>
-              <a:t>Second Outline Level</a:t>
-            </a:r>
-            <a:endParaRPr b="0" lang="en-US" sz="1800" spc="-1" strike="noStrike">
-              <a:solidFill>
-                <a:srgbClr val="000000"/>
-              </a:solidFill>
-              <a:latin typeface="Arial"/>
-            </a:endParaRPr>
-          </a:p>
-          <a:p>
-            <a:pPr lvl="2" marL="1296000" indent="-288000">
-              <a:spcBef>
-                <a:spcPts val="850"/>
-              </a:spcBef>
-              <a:buClr>
-                <a:srgbClr val="000000"/>
-              </a:buClr>
-              <a:buSzPct val="45000"/>
-              <a:buFont typeface="Wingdings" charset="2"/>
-              <a:buChar char=""/>
-            </a:pPr>
-            <a:r>
-              <a:rPr b="0" lang="en-US" sz="1800" spc="-1" strike="noStrike">
-                <a:solidFill>
-                  <a:srgbClr val="000000"/>
-                </a:solidFill>
-                <a:latin typeface="Arial"/>
-              </a:rPr>
-              <a:t>Third Outline Level</a:t>
-            </a:r>
-            <a:endParaRPr b="0" lang="en-US" sz="1800" spc="-1" strike="noStrike">
-              <a:solidFill>
-                <a:srgbClr val="000000"/>
-              </a:solidFill>
-              <a:latin typeface="Arial"/>
-            </a:endParaRPr>
-          </a:p>
-          <a:p>
-            <a:pPr lvl="3" marL="1728000" indent="-216000">
-              <a:spcBef>
-                <a:spcPts val="567"/>
-              </a:spcBef>
-              <a:buClr>
-                <a:srgbClr val="000000"/>
-              </a:buClr>
-              <a:buSzPct val="75000"/>
-              <a:buFont typeface="Symbol" charset="2"/>
-              <a:buChar char=""/>
-            </a:pPr>
-            <a:r>
-              <a:rPr b="0" lang="en-US" sz="1800" spc="-1" strike="noStrike">
-                <a:solidFill>
-                  <a:srgbClr val="000000"/>
-                </a:solidFill>
-                <a:latin typeface="Arial"/>
-              </a:rPr>
-              <a:t>Fourth Outline Level</a:t>
-            </a:r>
-            <a:endParaRPr b="0" lang="en-US" sz="1800" spc="-1" strike="noStrike">
-              <a:solidFill>
-                <a:srgbClr val="000000"/>
-              </a:solidFill>
-              <a:latin typeface="Arial"/>
-            </a:endParaRPr>
-          </a:p>
-          <a:p>
-            <a:pPr lvl="4" marL="2160000" indent="-216000">
-              <a:spcBef>
-                <a:spcPts val="283"/>
-              </a:spcBef>
-              <a:buClr>
-                <a:srgbClr val="000000"/>
-              </a:buClr>
-              <a:buSzPct val="45000"/>
-              <a:buFont typeface="Wingdings" charset="2"/>
-              <a:buChar char=""/>
-            </a:pPr>
-            <a:r>
-              <a:rPr b="0" lang="en-US" sz="1800" spc="-1" strike="noStrike">
-                <a:solidFill>
-                  <a:srgbClr val="000000"/>
-                </a:solidFill>
-                <a:latin typeface="Arial"/>
-              </a:rPr>
-              <a:t>Fifth Outline Level</a:t>
-            </a:r>
-            <a:endParaRPr b="0" lang="en-US" sz="1800" spc="-1" strike="noStrike">
-              <a:solidFill>
-                <a:srgbClr val="000000"/>
-              </a:solidFill>
-              <a:latin typeface="Arial"/>
-            </a:endParaRPr>
-          </a:p>
-          <a:p>
-            <a:pPr lvl="5" marL="2592000" indent="-216000">
-              <a:spcBef>
-                <a:spcPts val="283"/>
-              </a:spcBef>
-              <a:buClr>
-                <a:srgbClr val="000000"/>
-              </a:buClr>
-              <a:buSzPct val="45000"/>
-              <a:buFont typeface="Wingdings" charset="2"/>
-              <a:buChar char=""/>
-            </a:pPr>
-            <a:r>
-              <a:rPr b="0" lang="en-US" sz="1800" spc="-1" strike="noStrike">
-                <a:solidFill>
-                  <a:srgbClr val="000000"/>
-                </a:solidFill>
-                <a:latin typeface="Arial"/>
-              </a:rPr>
-              <a:t>Sixth Outline Level</a:t>
-            </a:r>
-            <a:endParaRPr b="0" lang="en-US" sz="1800" spc="-1" strike="noStrike">
-              <a:solidFill>
-                <a:srgbClr val="000000"/>
-              </a:solidFill>
-              <a:latin typeface="Arial"/>
-            </a:endParaRPr>
-          </a:p>
-          <a:p>
-            <a:pPr lvl="6" marL="3024000" indent="-216000">
-              <a:spcBef>
-                <a:spcPts val="283"/>
-              </a:spcBef>
-              <a:buClr>
-                <a:srgbClr val="000000"/>
-              </a:buClr>
-              <a:buSzPct val="45000"/>
-              <a:buFont typeface="Wingdings" charset="2"/>
-              <a:buChar char=""/>
-            </a:pPr>
-            <a:r>
-              <a:rPr b="0" lang="en-US" sz="1800" spc="-1" strike="noStrike">
-                <a:solidFill>
-                  <a:srgbClr val="000000"/>
-                </a:solidFill>
-                <a:latin typeface="Arial"/>
-              </a:rPr>
-              <a:t>Seventh Outline Level</a:t>
-            </a:r>
-            <a:endParaRPr b="0" lang="en-US" sz="1800" spc="-1" strike="noStrike">
-              <a:solidFill>
-                <a:srgbClr val="000000"/>
-              </a:solidFill>
-              <a:latin typeface="Arial"/>
-            </a:endParaRPr>
-          </a:p>
-        </p:txBody>
-      </p:sp>
-      <p:sp>
-        <p:nvSpPr>
-          <p:cNvPr id="20" name="PlaceHolder 5"/>
-          <p:cNvSpPr>
-            <a:spLocks noGrp="1"/>
-          </p:cNvSpPr>
-          <p:nvPr>
-            <p:ph type="body"/>
-          </p:nvPr>
-        </p:nvSpPr>
-        <p:spPr>
-          <a:xfrm>
-            <a:off x="609480" y="3682080"/>
-            <a:ext cx="3532680" cy="1896480"/>
-          </a:xfrm>
-          <a:prstGeom prst="rect">
-            <a:avLst/>
-          </a:prstGeom>
-          <a:noFill/>
-          <a:ln w="0">
-            <a:noFill/>
-          </a:ln>
-        </p:spPr>
-        <p:txBody>
-          <a:bodyPr lIns="0" rIns="0" tIns="0" bIns="0" anchor="t">
-            <a:normAutofit fontScale="62222" lnSpcReduction="20000"/>
-          </a:bodyPr>
-          <a:p>
-            <a:pPr marL="432000" indent="-324000">
-              <a:spcBef>
-                <a:spcPts val="1417"/>
-              </a:spcBef>
-              <a:buClr>
-                <a:srgbClr val="000000"/>
-              </a:buClr>
-              <a:buSzPct val="45000"/>
-              <a:buFont typeface="Wingdings" charset="2"/>
-              <a:buChar char=""/>
-            </a:pPr>
-            <a:r>
-              <a:rPr b="0" lang="en-US" sz="1800" spc="-1" strike="noStrike">
-                <a:solidFill>
-                  <a:srgbClr val="000000"/>
-                </a:solidFill>
-                <a:latin typeface="Arial"/>
-              </a:rPr>
-              <a:t>Click to edit the outline text format</a:t>
-            </a:r>
-            <a:endParaRPr b="0" lang="en-US" sz="1800" spc="-1" strike="noStrike">
-              <a:solidFill>
-                <a:srgbClr val="000000"/>
-              </a:solidFill>
-              <a:latin typeface="Arial"/>
-            </a:endParaRPr>
-          </a:p>
-          <a:p>
-            <a:pPr lvl="1" marL="864000" indent="-324000">
-              <a:spcBef>
-                <a:spcPts val="1134"/>
-              </a:spcBef>
-              <a:buClr>
-                <a:srgbClr val="000000"/>
-              </a:buClr>
-              <a:buSzPct val="75000"/>
-              <a:buFont typeface="Symbol" charset="2"/>
-              <a:buChar char=""/>
-            </a:pPr>
-            <a:r>
-              <a:rPr b="0" lang="en-US" sz="1800" spc="-1" strike="noStrike">
-                <a:solidFill>
-                  <a:srgbClr val="000000"/>
-                </a:solidFill>
-                <a:latin typeface="Arial"/>
-              </a:rPr>
-              <a:t>Second Outline Level</a:t>
-            </a:r>
-            <a:endParaRPr b="0" lang="en-US" sz="1800" spc="-1" strike="noStrike">
-              <a:solidFill>
-                <a:srgbClr val="000000"/>
-              </a:solidFill>
-              <a:latin typeface="Arial"/>
-            </a:endParaRPr>
-          </a:p>
-          <a:p>
-            <a:pPr lvl="2" marL="1296000" indent="-288000">
-              <a:spcBef>
-                <a:spcPts val="850"/>
-              </a:spcBef>
-              <a:buClr>
-                <a:srgbClr val="000000"/>
-              </a:buClr>
-              <a:buSzPct val="45000"/>
-              <a:buFont typeface="Wingdings" charset="2"/>
-              <a:buChar char=""/>
-            </a:pPr>
-            <a:r>
-              <a:rPr b="0" lang="en-US" sz="1800" spc="-1" strike="noStrike">
-                <a:solidFill>
-                  <a:srgbClr val="000000"/>
-                </a:solidFill>
-                <a:latin typeface="Arial"/>
-              </a:rPr>
-              <a:t>Third Outline Level</a:t>
-            </a:r>
-            <a:endParaRPr b="0" lang="en-US" sz="1800" spc="-1" strike="noStrike">
-              <a:solidFill>
-                <a:srgbClr val="000000"/>
-              </a:solidFill>
-              <a:latin typeface="Arial"/>
-            </a:endParaRPr>
-          </a:p>
-          <a:p>
-            <a:pPr lvl="3" marL="1728000" indent="-216000">
-              <a:spcBef>
-                <a:spcPts val="567"/>
-              </a:spcBef>
-              <a:buClr>
-                <a:srgbClr val="000000"/>
-              </a:buClr>
-              <a:buSzPct val="75000"/>
-              <a:buFont typeface="Symbol" charset="2"/>
-              <a:buChar char=""/>
-            </a:pPr>
-            <a:r>
-              <a:rPr b="0" lang="en-US" sz="1800" spc="-1" strike="noStrike">
-                <a:solidFill>
-                  <a:srgbClr val="000000"/>
-                </a:solidFill>
-                <a:latin typeface="Arial"/>
-              </a:rPr>
-              <a:t>Fourth Outline Level</a:t>
-            </a:r>
-            <a:endParaRPr b="0" lang="en-US" sz="1800" spc="-1" strike="noStrike">
-              <a:solidFill>
-                <a:srgbClr val="000000"/>
-              </a:solidFill>
-              <a:latin typeface="Arial"/>
-            </a:endParaRPr>
-          </a:p>
-          <a:p>
-            <a:pPr lvl="4" marL="2160000" indent="-216000">
-              <a:spcBef>
-                <a:spcPts val="283"/>
-              </a:spcBef>
-              <a:buClr>
-                <a:srgbClr val="000000"/>
-              </a:buClr>
-              <a:buSzPct val="45000"/>
-              <a:buFont typeface="Wingdings" charset="2"/>
-              <a:buChar char=""/>
-            </a:pPr>
-            <a:r>
-              <a:rPr b="0" lang="en-US" sz="1800" spc="-1" strike="noStrike">
-                <a:solidFill>
-                  <a:srgbClr val="000000"/>
-                </a:solidFill>
-                <a:latin typeface="Arial"/>
-              </a:rPr>
-              <a:t>Fifth Outline Level</a:t>
-            </a:r>
-            <a:endParaRPr b="0" lang="en-US" sz="1800" spc="-1" strike="noStrike">
-              <a:solidFill>
-                <a:srgbClr val="000000"/>
-              </a:solidFill>
-              <a:latin typeface="Arial"/>
-            </a:endParaRPr>
-          </a:p>
-          <a:p>
-            <a:pPr lvl="5" marL="2592000" indent="-216000">
-              <a:spcBef>
-                <a:spcPts val="283"/>
-              </a:spcBef>
-              <a:buClr>
-                <a:srgbClr val="000000"/>
-              </a:buClr>
-              <a:buSzPct val="45000"/>
-              <a:buFont typeface="Wingdings" charset="2"/>
-              <a:buChar char=""/>
-            </a:pPr>
-            <a:r>
-              <a:rPr b="0" lang="en-US" sz="1800" spc="-1" strike="noStrike">
-                <a:solidFill>
-                  <a:srgbClr val="000000"/>
-                </a:solidFill>
-                <a:latin typeface="Arial"/>
-              </a:rPr>
-              <a:t>Sixth Outline Level</a:t>
-            </a:r>
-            <a:endParaRPr b="0" lang="en-US" sz="1800" spc="-1" strike="noStrike">
-              <a:solidFill>
-                <a:srgbClr val="000000"/>
-              </a:solidFill>
-              <a:latin typeface="Arial"/>
-            </a:endParaRPr>
-          </a:p>
-          <a:p>
-            <a:pPr lvl="6" marL="3024000" indent="-216000">
-              <a:spcBef>
-                <a:spcPts val="283"/>
-              </a:spcBef>
-              <a:buClr>
-                <a:srgbClr val="000000"/>
-              </a:buClr>
-              <a:buSzPct val="45000"/>
-              <a:buFont typeface="Wingdings" charset="2"/>
-              <a:buChar char=""/>
-            </a:pPr>
-            <a:r>
-              <a:rPr b="0" lang="en-US" sz="1800" spc="-1" strike="noStrike">
-                <a:solidFill>
-                  <a:srgbClr val="000000"/>
-                </a:solidFill>
-                <a:latin typeface="Arial"/>
-              </a:rPr>
-              <a:t>Seventh Outline Level</a:t>
-            </a:r>
-            <a:endParaRPr b="0" lang="en-US" sz="1800" spc="-1" strike="noStrike">
-              <a:solidFill>
-                <a:srgbClr val="000000"/>
-              </a:solidFill>
-              <a:latin typeface="Arial"/>
-            </a:endParaRPr>
-          </a:p>
-        </p:txBody>
-      </p:sp>
-      <p:sp>
-        <p:nvSpPr>
-          <p:cNvPr id="21" name="PlaceHolder 6"/>
-          <p:cNvSpPr>
-            <a:spLocks noGrp="1"/>
-          </p:cNvSpPr>
-          <p:nvPr>
-            <p:ph type="body"/>
-          </p:nvPr>
-        </p:nvSpPr>
-        <p:spPr>
-          <a:xfrm>
-            <a:off x="4319640" y="3682080"/>
-            <a:ext cx="3532680" cy="1896480"/>
-          </a:xfrm>
-          <a:prstGeom prst="rect">
-            <a:avLst/>
-          </a:prstGeom>
-          <a:noFill/>
-          <a:ln w="0">
-            <a:noFill/>
-          </a:ln>
-        </p:spPr>
-        <p:txBody>
-          <a:bodyPr lIns="0" rIns="0" tIns="0" bIns="0" anchor="t">
-            <a:normAutofit fontScale="62222" lnSpcReduction="20000"/>
-          </a:bodyPr>
-          <a:p>
-            <a:pPr marL="432000" indent="-324000">
-              <a:spcBef>
-                <a:spcPts val="1417"/>
-              </a:spcBef>
-              <a:buClr>
-                <a:srgbClr val="000000"/>
-              </a:buClr>
-              <a:buSzPct val="45000"/>
-              <a:buFont typeface="Wingdings" charset="2"/>
-              <a:buChar char=""/>
-            </a:pPr>
-            <a:r>
-              <a:rPr b="0" lang="en-US" sz="1800" spc="-1" strike="noStrike">
-                <a:solidFill>
-                  <a:srgbClr val="000000"/>
-                </a:solidFill>
-                <a:latin typeface="Arial"/>
-              </a:rPr>
-              <a:t>Click to edit the outline text format</a:t>
-            </a:r>
-            <a:endParaRPr b="0" lang="en-US" sz="1800" spc="-1" strike="noStrike">
-              <a:solidFill>
-                <a:srgbClr val="000000"/>
-              </a:solidFill>
-              <a:latin typeface="Arial"/>
-            </a:endParaRPr>
-          </a:p>
-          <a:p>
-            <a:pPr lvl="1" marL="864000" indent="-324000">
-              <a:spcBef>
-                <a:spcPts val="1134"/>
-              </a:spcBef>
-              <a:buClr>
-                <a:srgbClr val="000000"/>
-              </a:buClr>
-              <a:buSzPct val="75000"/>
-              <a:buFont typeface="Symbol" charset="2"/>
-              <a:buChar char=""/>
-            </a:pPr>
-            <a:r>
-              <a:rPr b="0" lang="en-US" sz="1800" spc="-1" strike="noStrike">
-                <a:solidFill>
-                  <a:srgbClr val="000000"/>
-                </a:solidFill>
-                <a:latin typeface="Arial"/>
-              </a:rPr>
-              <a:t>Second Outline Level</a:t>
-            </a:r>
-            <a:endParaRPr b="0" lang="en-US" sz="1800" spc="-1" strike="noStrike">
-              <a:solidFill>
-                <a:srgbClr val="000000"/>
-              </a:solidFill>
-              <a:latin typeface="Arial"/>
-            </a:endParaRPr>
-          </a:p>
-          <a:p>
-            <a:pPr lvl="2" marL="1296000" indent="-288000">
-              <a:spcBef>
-                <a:spcPts val="850"/>
-              </a:spcBef>
-              <a:buClr>
-                <a:srgbClr val="000000"/>
-              </a:buClr>
-              <a:buSzPct val="45000"/>
-              <a:buFont typeface="Wingdings" charset="2"/>
-              <a:buChar char=""/>
-            </a:pPr>
-            <a:r>
-              <a:rPr b="0" lang="en-US" sz="1800" spc="-1" strike="noStrike">
-                <a:solidFill>
-                  <a:srgbClr val="000000"/>
-                </a:solidFill>
-                <a:latin typeface="Arial"/>
-              </a:rPr>
-              <a:t>Third Outline Level</a:t>
-            </a:r>
-            <a:endParaRPr b="0" lang="en-US" sz="1800" spc="-1" strike="noStrike">
-              <a:solidFill>
-                <a:srgbClr val="000000"/>
-              </a:solidFill>
-              <a:latin typeface="Arial"/>
-            </a:endParaRPr>
-          </a:p>
-          <a:p>
-            <a:pPr lvl="3" marL="1728000" indent="-216000">
-              <a:spcBef>
-                <a:spcPts val="567"/>
-              </a:spcBef>
-              <a:buClr>
-                <a:srgbClr val="000000"/>
-              </a:buClr>
-              <a:buSzPct val="75000"/>
-              <a:buFont typeface="Symbol" charset="2"/>
-              <a:buChar char=""/>
-            </a:pPr>
-            <a:r>
-              <a:rPr b="0" lang="en-US" sz="1800" spc="-1" strike="noStrike">
-                <a:solidFill>
-                  <a:srgbClr val="000000"/>
-                </a:solidFill>
-                <a:latin typeface="Arial"/>
-              </a:rPr>
-              <a:t>Fourth Outline Level</a:t>
-            </a:r>
-            <a:endParaRPr b="0" lang="en-US" sz="1800" spc="-1" strike="noStrike">
-              <a:solidFill>
-                <a:srgbClr val="000000"/>
-              </a:solidFill>
-              <a:latin typeface="Arial"/>
-            </a:endParaRPr>
-          </a:p>
-          <a:p>
-            <a:pPr lvl="4" marL="2160000" indent="-216000">
-              <a:spcBef>
-                <a:spcPts val="283"/>
-              </a:spcBef>
-              <a:buClr>
-                <a:srgbClr val="000000"/>
-              </a:buClr>
-              <a:buSzPct val="45000"/>
-              <a:buFont typeface="Wingdings" charset="2"/>
-              <a:buChar char=""/>
-            </a:pPr>
-            <a:r>
-              <a:rPr b="0" lang="en-US" sz="1800" spc="-1" strike="noStrike">
-                <a:solidFill>
-                  <a:srgbClr val="000000"/>
-                </a:solidFill>
-                <a:latin typeface="Arial"/>
-              </a:rPr>
-              <a:t>Fifth Outline Level</a:t>
-            </a:r>
-            <a:endParaRPr b="0" lang="en-US" sz="1800" spc="-1" strike="noStrike">
-              <a:solidFill>
-                <a:srgbClr val="000000"/>
-              </a:solidFill>
-              <a:latin typeface="Arial"/>
-            </a:endParaRPr>
-          </a:p>
-          <a:p>
-            <a:pPr lvl="5" marL="2592000" indent="-216000">
-              <a:spcBef>
-                <a:spcPts val="283"/>
-              </a:spcBef>
-              <a:buClr>
-                <a:srgbClr val="000000"/>
-              </a:buClr>
-              <a:buSzPct val="45000"/>
-              <a:buFont typeface="Wingdings" charset="2"/>
-              <a:buChar char=""/>
-            </a:pPr>
-            <a:r>
-              <a:rPr b="0" lang="en-US" sz="1800" spc="-1" strike="noStrike">
-                <a:solidFill>
-                  <a:srgbClr val="000000"/>
-                </a:solidFill>
-                <a:latin typeface="Arial"/>
-              </a:rPr>
-              <a:t>Sixth Outline Level</a:t>
-            </a:r>
-            <a:endParaRPr b="0" lang="en-US" sz="1800" spc="-1" strike="noStrike">
-              <a:solidFill>
-                <a:srgbClr val="000000"/>
-              </a:solidFill>
-              <a:latin typeface="Arial"/>
-            </a:endParaRPr>
-          </a:p>
-          <a:p>
-            <a:pPr lvl="6" marL="3024000" indent="-216000">
-              <a:spcBef>
-                <a:spcPts val="283"/>
-              </a:spcBef>
-              <a:buClr>
-                <a:srgbClr val="000000"/>
-              </a:buClr>
-              <a:buSzPct val="45000"/>
-              <a:buFont typeface="Wingdings" charset="2"/>
-              <a:buChar char=""/>
-            </a:pPr>
-            <a:r>
-              <a:rPr b="0" lang="en-US" sz="1800" spc="-1" strike="noStrike">
-                <a:solidFill>
-                  <a:srgbClr val="000000"/>
-                </a:solidFill>
-                <a:latin typeface="Arial"/>
-              </a:rPr>
-              <a:t>Seventh Outline Level</a:t>
-            </a:r>
-            <a:endParaRPr b="0" lang="en-US" sz="1800" spc="-1" strike="noStrike">
-              <a:solidFill>
-                <a:srgbClr val="000000"/>
-              </a:solidFill>
-              <a:latin typeface="Arial"/>
-            </a:endParaRPr>
-          </a:p>
-        </p:txBody>
-      </p:sp>
-      <p:sp>
-        <p:nvSpPr>
-          <p:cNvPr id="22" name="PlaceHolder 7"/>
-          <p:cNvSpPr>
-            <a:spLocks noGrp="1"/>
-          </p:cNvSpPr>
-          <p:nvPr>
-            <p:ph type="body"/>
-          </p:nvPr>
-        </p:nvSpPr>
-        <p:spPr>
-          <a:xfrm>
-            <a:off x="8029800" y="3682080"/>
-            <a:ext cx="3532680" cy="1896480"/>
-          </a:xfrm>
-          <a:prstGeom prst="rect">
-            <a:avLst/>
-          </a:prstGeom>
-          <a:noFill/>
-          <a:ln w="0">
-            <a:noFill/>
-          </a:ln>
-        </p:spPr>
-        <p:txBody>
-          <a:bodyPr lIns="0" rIns="0" tIns="0" bIns="0" anchor="t">
-            <a:normAutofit fontScale="62222" lnSpcReduction="20000"/>
-          </a:bodyPr>
-          <a:p>
-            <a:pPr marL="432000" indent="-324000">
-              <a:spcBef>
-                <a:spcPts val="1417"/>
-              </a:spcBef>
-              <a:buClr>
-                <a:srgbClr val="000000"/>
-              </a:buClr>
-              <a:buSzPct val="45000"/>
-              <a:buFont typeface="Wingdings" charset="2"/>
-              <a:buChar char=""/>
-            </a:pPr>
-            <a:r>
-              <a:rPr b="0" lang="en-US" sz="1800" spc="-1" strike="noStrike">
-                <a:solidFill>
-                  <a:srgbClr val="000000"/>
-                </a:solidFill>
-                <a:latin typeface="Arial"/>
-              </a:rPr>
-              <a:t>Click to edit the outline text format</a:t>
-            </a:r>
-            <a:endParaRPr b="0" lang="en-US" sz="1800" spc="-1" strike="noStrike">
-              <a:solidFill>
-                <a:srgbClr val="000000"/>
-              </a:solidFill>
-              <a:latin typeface="Arial"/>
-            </a:endParaRPr>
-          </a:p>
-          <a:p>
-            <a:pPr lvl="1" marL="864000" indent="-324000">
-              <a:spcBef>
-                <a:spcPts val="1134"/>
-              </a:spcBef>
-              <a:buClr>
-                <a:srgbClr val="000000"/>
-              </a:buClr>
-              <a:buSzPct val="75000"/>
-              <a:buFont typeface="Symbol" charset="2"/>
-              <a:buChar char=""/>
-            </a:pPr>
-            <a:r>
-              <a:rPr b="0" lang="en-US" sz="1800" spc="-1" strike="noStrike">
-                <a:solidFill>
-                  <a:srgbClr val="000000"/>
-                </a:solidFill>
-                <a:latin typeface="Arial"/>
-              </a:rPr>
-              <a:t>Second Outline Level</a:t>
-            </a:r>
-            <a:endParaRPr b="0" lang="en-US" sz="1800" spc="-1" strike="noStrike">
-              <a:solidFill>
-                <a:srgbClr val="000000"/>
-              </a:solidFill>
-              <a:latin typeface="Arial"/>
-            </a:endParaRPr>
-          </a:p>
-          <a:p>
-            <a:pPr lvl="2" marL="1296000" indent="-288000">
-              <a:spcBef>
-                <a:spcPts val="850"/>
-              </a:spcBef>
-              <a:buClr>
-                <a:srgbClr val="000000"/>
-              </a:buClr>
-              <a:buSzPct val="45000"/>
-              <a:buFont typeface="Wingdings" charset="2"/>
-              <a:buChar char=""/>
-            </a:pPr>
-            <a:r>
-              <a:rPr b="0" lang="en-US" sz="1800" spc="-1" strike="noStrike">
-                <a:solidFill>
-                  <a:srgbClr val="000000"/>
-                </a:solidFill>
-                <a:latin typeface="Arial"/>
-              </a:rPr>
-              <a:t>Third Outline Level</a:t>
-            </a:r>
-            <a:endParaRPr b="0" lang="en-US" sz="1800" spc="-1" strike="noStrike">
-              <a:solidFill>
-                <a:srgbClr val="000000"/>
-              </a:solidFill>
-              <a:latin typeface="Arial"/>
-            </a:endParaRPr>
-          </a:p>
-          <a:p>
-            <a:pPr lvl="3" marL="1728000" indent="-216000">
-              <a:spcBef>
-                <a:spcPts val="567"/>
-              </a:spcBef>
-              <a:buClr>
-                <a:srgbClr val="000000"/>
-              </a:buClr>
-              <a:buSzPct val="75000"/>
-              <a:buFont typeface="Symbol" charset="2"/>
-              <a:buChar char=""/>
-            </a:pPr>
-            <a:r>
-              <a:rPr b="0" lang="en-US" sz="1800" spc="-1" strike="noStrike">
-                <a:solidFill>
-                  <a:srgbClr val="000000"/>
-                </a:solidFill>
-                <a:latin typeface="Arial"/>
-              </a:rPr>
-              <a:t>Fourth Outline Level</a:t>
-            </a:r>
-            <a:endParaRPr b="0" lang="en-US" sz="1800" spc="-1" strike="noStrike">
-              <a:solidFill>
-                <a:srgbClr val="000000"/>
-              </a:solidFill>
-              <a:latin typeface="Arial"/>
-            </a:endParaRPr>
-          </a:p>
-          <a:p>
-            <a:pPr lvl="4" marL="2160000" indent="-216000">
-              <a:spcBef>
-                <a:spcPts val="283"/>
-              </a:spcBef>
-              <a:buClr>
-                <a:srgbClr val="000000"/>
-              </a:buClr>
-              <a:buSzPct val="45000"/>
-              <a:buFont typeface="Wingdings" charset="2"/>
-              <a:buChar char=""/>
-            </a:pPr>
-            <a:r>
-              <a:rPr b="0" lang="en-US" sz="1800" spc="-1" strike="noStrike">
-                <a:solidFill>
-                  <a:srgbClr val="000000"/>
-                </a:solidFill>
-                <a:latin typeface="Arial"/>
-              </a:rPr>
-              <a:t>Fifth Outline Level</a:t>
-            </a:r>
-            <a:endParaRPr b="0" lang="en-US" sz="1800" spc="-1" strike="noStrike">
-              <a:solidFill>
-                <a:srgbClr val="000000"/>
-              </a:solidFill>
-              <a:latin typeface="Arial"/>
-            </a:endParaRPr>
-          </a:p>
-          <a:p>
-            <a:pPr lvl="5" marL="2592000" indent="-216000">
-              <a:spcBef>
-                <a:spcPts val="283"/>
-              </a:spcBef>
-              <a:buClr>
-                <a:srgbClr val="000000"/>
-              </a:buClr>
-              <a:buSzPct val="45000"/>
-              <a:buFont typeface="Wingdings" charset="2"/>
-              <a:buChar char=""/>
-            </a:pPr>
-            <a:r>
-              <a:rPr b="0" lang="en-US" sz="1800" spc="-1" strike="noStrike">
-                <a:solidFill>
-                  <a:srgbClr val="000000"/>
-                </a:solidFill>
-                <a:latin typeface="Arial"/>
-              </a:rPr>
-              <a:t>Sixth Outline Level</a:t>
-            </a:r>
-            <a:endParaRPr b="0" lang="en-US" sz="1800" spc="-1" strike="noStrike">
-              <a:solidFill>
-                <a:srgbClr val="000000"/>
-              </a:solidFill>
-              <a:latin typeface="Arial"/>
-            </a:endParaRPr>
-          </a:p>
-          <a:p>
-            <a:pPr lvl="6" marL="3024000" indent="-216000">
-              <a:spcBef>
-                <a:spcPts val="283"/>
-              </a:spcBef>
-              <a:buClr>
-                <a:srgbClr val="000000"/>
-              </a:buClr>
-              <a:buSzPct val="45000"/>
-              <a:buFont typeface="Wingdings" charset="2"/>
-              <a:buChar char=""/>
-            </a:pPr>
-            <a:r>
-              <a:rPr b="0" lang="en-US" sz="1800" spc="-1" strike="noStrike">
-                <a:solidFill>
-                  <a:srgbClr val="000000"/>
-                </a:solidFill>
-                <a:latin typeface="Arial"/>
-              </a:rPr>
-              <a:t>Seventh Outline Level</a:t>
-            </a:r>
-            <a:endParaRPr b="0" lang="en-US" sz="1800" spc="-1" strike="noStrike">
-              <a:solidFill>
-                <a:srgbClr val="000000"/>
-              </a:solidFill>
-              <a:latin typeface="Arial"/>
-            </a:endParaRPr>
-          </a:p>
-        </p:txBody>
-      </p:sp>
-    </p:spTree>
-  </p:cSld>
-  <p:clrMap bg1="lt1" bg2="lt2" tx1="dk1" tx2="dk2" accent1="accent1" accent2="accent2" accent3="accent3" accent4="accent4" accent5="accent5" accent6="accent6" hlink="hlink" folHlink="folHlink"/>
-  <p:sldLayoutIdLst>
-    <p:sldLayoutId id="2147483655" r:id="rId2"/>
-  </p:sldLayoutIdLst>
-</p:sldMaster>
-</file>
-
-<file path=ppt/slideMasters/slideMaster5.xml><?xml version="1.0" encoding="utf-8"?>
-<p:sldMaster xmlns:a="http://schemas.openxmlformats.org/drawingml/2006/main" xmlns:p="http://schemas.openxmlformats.org/presentationml/2006/main" xmlns:r="http://schemas.openxmlformats.org/officeDocument/2006/relationships" xmlns:p14="http://schemas.microsoft.com/office/powerpoint/2010/main" xmlns:p15="http://schemas.microsoft.com/office/powerpoint/2012/main" xmlns:mc="http://schemas.openxmlformats.org/markup-compatibility/2006">
-  <p:cSld>
-    <p:bg>
-      <p:bgPr>
-        <a:solidFill>
-          <a:srgbClr val="ffffff"/>
-        </a:solidFill>
-      </p:bgPr>
-    </p:bg>
-    <p:spTree>
-      <p:nvGrpSpPr>
-        <p:cNvPr id="1" name=""/>
-        <p:cNvGrpSpPr/>
-        <p:nvPr/>
-      </p:nvGrpSpPr>
-      <p:grpSpPr>
-        <a:xfrm>
-          <a:off x="0" y="0"/>
-          <a:ext cx="0" cy="0"/>
-          <a:chOff x="0" y="0"/>
-          <a:chExt cx="0" cy="0"/>
-        </a:xfrm>
-      </p:grpSpPr>
-      <p:sp>
-        <p:nvSpPr>
-          <p:cNvPr id="23" name="PlaceHolder 1"/>
-          <p:cNvSpPr>
-            <a:spLocks noGrp="1"/>
-          </p:cNvSpPr>
-          <p:nvPr>
-            <p:ph type="title"/>
-          </p:nvPr>
-        </p:nvSpPr>
-        <p:spPr>
-          <a:xfrm>
-            <a:off x="1523880" y="1122480"/>
-            <a:ext cx="9143280" cy="2386800"/>
-          </a:xfrm>
-          <a:prstGeom prst="rect">
-            <a:avLst/>
-          </a:prstGeom>
-          <a:noFill/>
-          <a:ln w="0">
-            <a:noFill/>
-          </a:ln>
-        </p:spPr>
-        <p:txBody>
-          <a:bodyPr lIns="0" rIns="0" tIns="0" bIns="0" anchor="ctr">
-            <a:noAutofit/>
-          </a:bodyPr>
-          <a:p>
-            <a:pPr indent="0">
-              <a:buNone/>
-            </a:pPr>
-            <a:r>
-              <a:rPr b="0" lang="en-US" sz="1800" spc="-1" strike="noStrike">
-                <a:solidFill>
-                  <a:srgbClr val="000000"/>
-                </a:solidFill>
-                <a:latin typeface="Arial"/>
-              </a:rPr>
-              <a:t>Click to edit the title text format</a:t>
-            </a:r>
-            <a:endParaRPr b="0" lang="en-US" sz="1800" spc="-1" strike="noStrike">
-              <a:solidFill>
-                <a:srgbClr val="000000"/>
-              </a:solidFill>
-              <a:latin typeface="Arial"/>
-            </a:endParaRPr>
-          </a:p>
-        </p:txBody>
-      </p:sp>
-      <p:sp>
-        <p:nvSpPr>
-          <p:cNvPr id="24" name="PlaceHolder 2"/>
-          <p:cNvSpPr>
-            <a:spLocks noGrp="1"/>
-          </p:cNvSpPr>
-          <p:nvPr>
-            <p:ph type="body"/>
-          </p:nvPr>
-        </p:nvSpPr>
-        <p:spPr>
-          <a:xfrm>
-            <a:off x="609480" y="1604520"/>
-            <a:ext cx="10972440" cy="3977280"/>
+            <a:ext cx="10972080" cy="3976920"/>
           </a:xfrm>
           <a:prstGeom prst="rect">
             <a:avLst/>
@@ -7303,7 +5904,7 @@
               <a:buChar char=""/>
             </a:pPr>
             <a:r>
-              <a:rPr b="0" lang="en-US" sz="3200" spc="-1" strike="noStrike">
+              <a:rPr b="0" lang="en-US" sz="1800" spc="-1" strike="noStrike">
                 <a:solidFill>
                   <a:srgbClr val="000000"/>
                 </a:solidFill>
@@ -7311,7 +5912,7 @@
               </a:rPr>
               <a:t>Click to edit the outline text format</a:t>
             </a:r>
-            <a:endParaRPr b="0" lang="en-US" sz="3200" spc="-1" strike="noStrike">
+            <a:endParaRPr b="0" lang="en-US" sz="1800" spc="-1" strike="noStrike">
               <a:solidFill>
                 <a:srgbClr val="000000"/>
               </a:solidFill>
@@ -7331,7 +5932,7 @@
               <a:buChar char=""/>
             </a:pPr>
             <a:r>
-              <a:rPr b="0" lang="en-US" sz="2800" spc="-1" strike="noStrike">
+              <a:rPr b="0" lang="en-US" sz="1800" spc="-1" strike="noStrike">
                 <a:solidFill>
                   <a:srgbClr val="000000"/>
                 </a:solidFill>
@@ -7339,7 +5940,7 @@
               </a:rPr>
               <a:t>Second Outline Level</a:t>
             </a:r>
-            <a:endParaRPr b="0" lang="en-US" sz="2800" spc="-1" strike="noStrike">
+            <a:endParaRPr b="0" lang="en-US" sz="1800" spc="-1" strike="noStrike">
               <a:solidFill>
                 <a:srgbClr val="000000"/>
               </a:solidFill>
@@ -7359,7 +5960,7 @@
               <a:buChar char=""/>
             </a:pPr>
             <a:r>
-              <a:rPr b="0" lang="en-US" sz="2400" spc="-1" strike="noStrike">
+              <a:rPr b="0" lang="en-US" sz="1800" spc="-1" strike="noStrike">
                 <a:solidFill>
                   <a:srgbClr val="000000"/>
                 </a:solidFill>
@@ -7367,7 +5968,7 @@
               </a:rPr>
               <a:t>Third Outline Level</a:t>
             </a:r>
-            <a:endParaRPr b="0" lang="en-US" sz="2400" spc="-1" strike="noStrike">
+            <a:endParaRPr b="0" lang="en-US" sz="1800" spc="-1" strike="noStrike">
               <a:solidFill>
                 <a:srgbClr val="000000"/>
               </a:solidFill>
@@ -7387,7 +5988,7 @@
               <a:buChar char=""/>
             </a:pPr>
             <a:r>
-              <a:rPr b="0" lang="en-US" sz="2000" spc="-1" strike="noStrike">
+              <a:rPr b="0" lang="en-US" sz="1800" spc="-1" strike="noStrike">
                 <a:solidFill>
                   <a:srgbClr val="000000"/>
                 </a:solidFill>
@@ -7395,7 +5996,7 @@
               </a:rPr>
               <a:t>Fourth Outline Level</a:t>
             </a:r>
-            <a:endParaRPr b="0" lang="en-US" sz="2000" spc="-1" strike="noStrike">
+            <a:endParaRPr b="0" lang="en-US" sz="1800" spc="-1" strike="noStrike">
               <a:solidFill>
                 <a:srgbClr val="000000"/>
               </a:solidFill>
@@ -7415,7 +6016,7 @@
               <a:buChar char=""/>
             </a:pPr>
             <a:r>
-              <a:rPr b="0" lang="en-US" sz="2000" spc="-1" strike="noStrike">
+              <a:rPr b="0" lang="en-US" sz="1800" spc="-1" strike="noStrike">
                 <a:solidFill>
                   <a:srgbClr val="000000"/>
                 </a:solidFill>
@@ -7423,7 +6024,7 @@
               </a:rPr>
               <a:t>Fifth Outline Level</a:t>
             </a:r>
-            <a:endParaRPr b="0" lang="en-US" sz="2000" spc="-1" strike="noStrike">
+            <a:endParaRPr b="0" lang="en-US" sz="1800" spc="-1" strike="noStrike">
               <a:solidFill>
                 <a:srgbClr val="000000"/>
               </a:solidFill>
@@ -7443,7 +6044,7 @@
               <a:buChar char=""/>
             </a:pPr>
             <a:r>
-              <a:rPr b="0" lang="en-US" sz="2000" spc="-1" strike="noStrike">
+              <a:rPr b="0" lang="en-US" sz="1800" spc="-1" strike="noStrike">
                 <a:solidFill>
                   <a:srgbClr val="000000"/>
                 </a:solidFill>
@@ -7451,7 +6052,7 @@
               </a:rPr>
               <a:t>Sixth Outline Level</a:t>
             </a:r>
-            <a:endParaRPr b="0" lang="en-US" sz="2000" spc="-1" strike="noStrike">
+            <a:endParaRPr b="0" lang="en-US" sz="1800" spc="-1" strike="noStrike">
               <a:solidFill>
                 <a:srgbClr val="000000"/>
               </a:solidFill>
@@ -7471,7 +6072,7 @@
               <a:buChar char=""/>
             </a:pPr>
             <a:r>
-              <a:rPr b="0" lang="en-US" sz="2000" spc="-1" strike="noStrike">
+              <a:rPr b="0" lang="en-US" sz="1800" spc="-1" strike="noStrike">
                 <a:solidFill>
                   <a:srgbClr val="000000"/>
                 </a:solidFill>
@@ -7479,7 +6080,7 @@
               </a:rPr>
               <a:t>Seventh Outline Level</a:t>
             </a:r>
-            <a:endParaRPr b="0" lang="en-US" sz="2000" spc="-1" strike="noStrike">
+            <a:endParaRPr b="0" lang="en-US" sz="1800" spc="-1" strike="noStrike">
               <a:solidFill>
                 <a:srgbClr val="000000"/>
               </a:solidFill>
@@ -7523,7 +6124,7 @@
       </p:grpSpPr>
       <p:sp>
         <p:nvSpPr>
-          <p:cNvPr id="27" name="PlaceHolder 1"/>
+          <p:cNvPr id="20" name="PlaceHolder 1"/>
           <p:cNvSpPr>
             <a:spLocks noGrp="1"/>
           </p:cNvSpPr>
@@ -7534,7 +6135,7 @@
         <p:spPr>
           <a:xfrm>
             <a:off x="1523880" y="1122480"/>
-            <a:ext cx="9143280" cy="2386800"/>
+            <a:ext cx="9142920" cy="2386440"/>
           </a:xfrm>
           <a:prstGeom prst="rect">
             <a:avLst/>
@@ -7572,7 +6173,7 @@
       </p:sp>
       <p:sp>
         <p:nvSpPr>
-          <p:cNvPr id="28" name="PlaceHolder 2"/>
+          <p:cNvPr id="21" name="PlaceHolder 2"/>
           <p:cNvSpPr>
             <a:spLocks noGrp="1"/>
           </p:cNvSpPr>
@@ -7830,7 +6431,7 @@
       </p:grpSpPr>
       <p:sp>
         <p:nvSpPr>
-          <p:cNvPr id="31" name="PlaceHolder 1"/>
+          <p:cNvPr id="24" name="PlaceHolder 1"/>
           <p:cNvSpPr>
             <a:spLocks noGrp="1"/>
           </p:cNvSpPr>
@@ -7841,7 +6442,7 @@
         <p:spPr>
           <a:xfrm>
             <a:off x="1523880" y="1122480"/>
-            <a:ext cx="9143280" cy="2386800"/>
+            <a:ext cx="9142920" cy="2386440"/>
           </a:xfrm>
           <a:prstGeom prst="rect">
             <a:avLst/>
@@ -7879,7 +6480,7 @@
       </p:sp>
       <p:sp>
         <p:nvSpPr>
-          <p:cNvPr id="32" name="PlaceHolder 2"/>
+          <p:cNvPr id="25" name="PlaceHolder 2"/>
           <p:cNvSpPr>
             <a:spLocks noGrp="1"/>
           </p:cNvSpPr>
@@ -8104,7 +6705,7 @@
       </p:sp>
       <p:sp>
         <p:nvSpPr>
-          <p:cNvPr id="33" name="PlaceHolder 3"/>
+          <p:cNvPr id="26" name="PlaceHolder 3"/>
           <p:cNvSpPr>
             <a:spLocks noGrp="1"/>
           </p:cNvSpPr>
@@ -8362,7 +6963,7 @@
       </p:grpSpPr>
       <p:sp>
         <p:nvSpPr>
-          <p:cNvPr id="37" name="PlaceHolder 1"/>
+          <p:cNvPr id="30" name="PlaceHolder 1"/>
           <p:cNvSpPr>
             <a:spLocks noGrp="1"/>
           </p:cNvSpPr>
@@ -8373,7 +6974,7 @@
         <p:spPr>
           <a:xfrm>
             <a:off x="1523880" y="1122480"/>
-            <a:ext cx="9143280" cy="2386800"/>
+            <a:ext cx="9142920" cy="2386440"/>
           </a:xfrm>
           <a:prstGeom prst="rect">
             <a:avLst/>
@@ -8470,7 +7071,7 @@
       </p:grpSpPr>
       <p:pic>
         <p:nvPicPr>
-          <p:cNvPr id="69" name="Picture 2" descr="Image result for jetbrains mps logo"/>
+          <p:cNvPr id="62" name="Picture 2" descr="Image result for jetbrains mps logo"/>
           <p:cNvPicPr/>
           <p:nvPr/>
         </p:nvPicPr>
@@ -8481,7 +7082,7 @@
         <p:spPr>
           <a:xfrm>
             <a:off x="847800" y="1152360"/>
-            <a:ext cx="4419000" cy="4419000"/>
+            <a:ext cx="4418640" cy="4418640"/>
           </a:xfrm>
           <a:prstGeom prst="rect">
             <a:avLst/>
@@ -8493,14 +7094,14 @@
       </p:pic>
       <p:sp>
         <p:nvSpPr>
-          <p:cNvPr id="70" name="TextShape 1"/>
+          <p:cNvPr id="63" name="TextShape 1"/>
           <p:cNvSpPr/>
           <p:nvPr/>
         </p:nvSpPr>
         <p:spPr>
           <a:xfrm>
             <a:off x="1346040" y="865080"/>
-            <a:ext cx="10096560" cy="2386800"/>
+            <a:ext cx="10096200" cy="2386440"/>
           </a:xfrm>
           <a:prstGeom prst="rect">
             <a:avLst/>
@@ -8532,6 +7133,7 @@
                   <a:srgbClr val="000000"/>
                 </a:solidFill>
                 <a:latin typeface="Calibri"/>
+                <a:ea typeface="DejaVu Sans"/>
               </a:rPr>
               <a:t>MPS Introduction Course</a:t>
             </a:r>
@@ -8546,14 +7148,14 @@
       </p:sp>
       <p:sp>
         <p:nvSpPr>
-          <p:cNvPr id="71" name="TextShape 2"/>
+          <p:cNvPr id="64" name="TextShape 2"/>
           <p:cNvSpPr/>
           <p:nvPr/>
         </p:nvSpPr>
         <p:spPr>
           <a:xfrm>
             <a:off x="1356840" y="3030480"/>
-            <a:ext cx="10001160" cy="1654920"/>
+            <a:ext cx="10000800" cy="1654560"/>
           </a:xfrm>
           <a:prstGeom prst="rect">
             <a:avLst/>
@@ -8591,8 +7193,9 @@
                   <a:srgbClr val="595959"/>
                 </a:solidFill>
                 <a:latin typeface="Calibri"/>
-              </a:rPr>
-              <a:t>MPS 2024.1.x + mbeddr.platform / MPS Extensions + KernelF</a:t>
+                <a:ea typeface="DejaVu Sans"/>
+              </a:rPr>
+              <a:t>MPS 2025.1.x + mbeddr.platform / MPS Extensions + KernelF</a:t>
             </a:r>
             <a:endParaRPr b="0" lang="en-US" sz="2500" spc="-1" strike="noStrike">
               <a:solidFill>
@@ -8605,7 +7208,7 @@
       </p:sp>
       <p:pic>
         <p:nvPicPr>
-          <p:cNvPr id="72" name="Picture 10" descr="Image result for github logo"/>
+          <p:cNvPr id="65" name="Picture 10" descr="Image result for github logo"/>
           <p:cNvPicPr/>
           <p:nvPr/>
         </p:nvPicPr>
@@ -8617,7 +7220,7 @@
         <p:spPr>
           <a:xfrm>
             <a:off x="2158200" y="3448800"/>
-            <a:ext cx="305640" cy="310320"/>
+            <a:ext cx="305280" cy="309960"/>
           </a:xfrm>
           <a:prstGeom prst="rect">
             <a:avLst/>
@@ -8629,7 +7232,7 @@
       </p:pic>
       <p:sp>
         <p:nvSpPr>
-          <p:cNvPr id="73" name="CustomShape 3"/>
+          <p:cNvPr id="66" name="CustomShape 3"/>
           <p:cNvSpPr/>
           <p:nvPr/>
         </p:nvSpPr>
@@ -8683,7 +7286,7 @@
       </p:sp>
       <p:pic>
         <p:nvPicPr>
-          <p:cNvPr id="74" name="Picture 12" descr="Image result for jetbrains mps logo"/>
+          <p:cNvPr id="67" name="Picture 12" descr="Image result for jetbrains mps logo"/>
           <p:cNvPicPr/>
           <p:nvPr/>
         </p:nvPicPr>
@@ -8694,7 +7297,7 @@
         <p:spPr>
           <a:xfrm>
             <a:off x="7929360" y="933480"/>
-            <a:ext cx="3190320" cy="827640"/>
+            <a:ext cx="3189960" cy="827280"/>
           </a:xfrm>
           <a:prstGeom prst="rect">
             <a:avLst/>
@@ -8706,7 +7309,7 @@
       </p:pic>
       <p:pic>
         <p:nvPicPr>
-          <p:cNvPr id="75" name="Picture 12" descr="Image result for jetbrains mps logo"/>
+          <p:cNvPr id="68" name="Picture 12" descr="Image result for jetbrains mps logo"/>
           <p:cNvPicPr/>
           <p:nvPr/>
         </p:nvPicPr>
@@ -8718,7 +7321,7 @@
         <p:spPr>
           <a:xfrm>
             <a:off x="5283000" y="3987360"/>
-            <a:ext cx="4126320" cy="1584000"/>
+            <a:ext cx="4125960" cy="1583640"/>
           </a:xfrm>
           <a:prstGeom prst="rect">
             <a:avLst/>
@@ -8730,7 +7333,7 @@
       </p:pic>
       <p:pic>
         <p:nvPicPr>
-          <p:cNvPr id="76" name="Picture 14" descr="Image result for itemis logo"/>
+          <p:cNvPr id="69" name="Picture 14" descr="Image result for itemis logo"/>
           <p:cNvPicPr/>
           <p:nvPr/>
         </p:nvPicPr>
@@ -8741,7 +7344,7 @@
         <p:spPr>
           <a:xfrm>
             <a:off x="6609960" y="5983560"/>
-            <a:ext cx="1229760" cy="348120"/>
+            <a:ext cx="1229400" cy="347760"/>
           </a:xfrm>
           <a:prstGeom prst="rect">
             <a:avLst/>
@@ -8753,7 +7356,7 @@
       </p:pic>
       <p:pic>
         <p:nvPicPr>
-          <p:cNvPr id="77" name="Picture 1" descr=""/>
+          <p:cNvPr id="70" name="Picture 1" descr=""/>
           <p:cNvPicPr/>
           <p:nvPr/>
         </p:nvPicPr>
@@ -8764,7 +7367,7 @@
         <p:spPr>
           <a:xfrm>
             <a:off x="8199000" y="5954760"/>
-            <a:ext cx="2920320" cy="405720"/>
+            <a:ext cx="2919960" cy="405360"/>
           </a:xfrm>
           <a:prstGeom prst="rect">
             <a:avLst/>
@@ -8776,7 +7379,7 @@
       </p:pic>
       <p:pic>
         <p:nvPicPr>
-          <p:cNvPr id="78" name="Picture 3" descr=""/>
+          <p:cNvPr id="71" name="Picture 3" descr=""/>
           <p:cNvPicPr/>
           <p:nvPr/>
         </p:nvPicPr>
@@ -8787,7 +7390,7 @@
         <p:spPr>
           <a:xfrm>
             <a:off x="1798200" y="6034320"/>
-            <a:ext cx="648360" cy="297720"/>
+            <a:ext cx="648000" cy="297360"/>
           </a:xfrm>
           <a:prstGeom prst="rect">
             <a:avLst/>
@@ -8799,7 +7402,7 @@
       </p:pic>
       <p:sp>
         <p:nvSpPr>
-          <p:cNvPr id="79" name="CustomShape 4"/>
+          <p:cNvPr id="72" name="CustomShape 4"/>
           <p:cNvSpPr/>
           <p:nvPr/>
         </p:nvSpPr>

</xml_diff>